<commit_message>
Textual Tweets Clustering Based on User’s Interests
</commit_message>
<xml_diff>
--- a/Research Experience.pptx
+++ b/Research Experience.pptx
@@ -2336,7 +2336,7 @@
           <a:p>
             <a:fld id="{A84B3C7D-7ED1-A34F-BCFC-1C01389AE58C}" type="datetimeFigureOut">
               <a:rPr kumimoji="1" lang="zh-CN" altLang="en-US" smtClean="0"/>
-              <a:t>2022/4/20</a:t>
+              <a:t>2023/2/27</a:t>
             </a:fld>
             <a:endParaRPr kumimoji="1" lang="zh-CN" altLang="en-US" dirty="0"/>
           </a:p>
@@ -2501,7 +2501,7 @@
           <a:p>
             <a:fld id="{B0ACF2CF-5EF1-D24F-8F8B-C67282AA038A}" type="datetimeFigureOut">
               <a:rPr kumimoji="1" lang="zh-CN" altLang="en-US" smtClean="0"/>
-              <a:t>2022/4/20</a:t>
+              <a:t>2023/2/27</a:t>
             </a:fld>
             <a:endParaRPr kumimoji="1" lang="zh-CN" altLang="en-US" dirty="0"/>
           </a:p>
@@ -5575,7 +5575,7 @@
           <a:p>
             <a:fld id="{C764DE79-268F-4C1A-8933-263129D2AF90}" type="datetimeFigureOut">
               <a:rPr lang="en-US" smtClean="0"/>
-              <a:t>4/20/2022</a:t>
+              <a:t>2/27/2023</a:t>
             </a:fld>
             <a:endParaRPr lang="en-US" dirty="0"/>
           </a:p>
@@ -5773,7 +5773,7 @@
           <a:p>
             <a:fld id="{C764DE79-268F-4C1A-8933-263129D2AF90}" type="datetimeFigureOut">
               <a:rPr lang="en-US" smtClean="0"/>
-              <a:t>4/20/2022</a:t>
+              <a:t>2/27/2023</a:t>
             </a:fld>
             <a:endParaRPr lang="en-US" dirty="0"/>
           </a:p>
@@ -5981,7 +5981,7 @@
           <a:p>
             <a:fld id="{C764DE79-268F-4C1A-8933-263129D2AF90}" type="datetimeFigureOut">
               <a:rPr lang="en-US" smtClean="0"/>
-              <a:t>4/20/2022</a:t>
+              <a:t>2/27/2023</a:t>
             </a:fld>
             <a:endParaRPr lang="en-US" dirty="0"/>
           </a:p>
@@ -6800,7 +6800,7 @@
           <a:p>
             <a:fld id="{C764DE79-268F-4C1A-8933-263129D2AF90}" type="datetimeFigureOut">
               <a:rPr lang="en-US" smtClean="0"/>
-              <a:t>4/20/2022</a:t>
+              <a:t>2/27/2023</a:t>
             </a:fld>
             <a:endParaRPr lang="en-US" dirty="0"/>
           </a:p>
@@ -7075,7 +7075,7 @@
           <a:p>
             <a:fld id="{C764DE79-268F-4C1A-8933-263129D2AF90}" type="datetimeFigureOut">
               <a:rPr lang="en-US" smtClean="0"/>
-              <a:t>4/20/2022</a:t>
+              <a:t>2/27/2023</a:t>
             </a:fld>
             <a:endParaRPr lang="en-US" dirty="0"/>
           </a:p>
@@ -7340,7 +7340,7 @@
           <a:p>
             <a:fld id="{C764DE79-268F-4C1A-8933-263129D2AF90}" type="datetimeFigureOut">
               <a:rPr lang="en-US" smtClean="0"/>
-              <a:t>4/20/2022</a:t>
+              <a:t>2/27/2023</a:t>
             </a:fld>
             <a:endParaRPr lang="en-US" dirty="0"/>
           </a:p>
@@ -7752,7 +7752,7 @@
           <a:p>
             <a:fld id="{C764DE79-268F-4C1A-8933-263129D2AF90}" type="datetimeFigureOut">
               <a:rPr lang="en-US" smtClean="0"/>
-              <a:t>4/20/2022</a:t>
+              <a:t>2/27/2023</a:t>
             </a:fld>
             <a:endParaRPr lang="en-US" dirty="0"/>
           </a:p>
@@ -7893,7 +7893,7 @@
           <a:p>
             <a:fld id="{C764DE79-268F-4C1A-8933-263129D2AF90}" type="datetimeFigureOut">
               <a:rPr lang="en-US" smtClean="0"/>
-              <a:t>4/20/2022</a:t>
+              <a:t>2/27/2023</a:t>
             </a:fld>
             <a:endParaRPr lang="en-US" dirty="0"/>
           </a:p>
@@ -8006,7 +8006,7 @@
           <a:p>
             <a:fld id="{C764DE79-268F-4C1A-8933-263129D2AF90}" type="datetimeFigureOut">
               <a:rPr lang="en-US" smtClean="0"/>
-              <a:t>4/20/2022</a:t>
+              <a:t>2/27/2023</a:t>
             </a:fld>
             <a:endParaRPr lang="en-US" dirty="0"/>
           </a:p>
@@ -8317,7 +8317,7 @@
           <a:p>
             <a:fld id="{C764DE79-268F-4C1A-8933-263129D2AF90}" type="datetimeFigureOut">
               <a:rPr lang="en-US" smtClean="0"/>
-              <a:t>4/20/2022</a:t>
+              <a:t>2/27/2023</a:t>
             </a:fld>
             <a:endParaRPr lang="en-US" dirty="0"/>
           </a:p>
@@ -8605,7 +8605,7 @@
           <a:p>
             <a:fld id="{C764DE79-268F-4C1A-8933-263129D2AF90}" type="datetimeFigureOut">
               <a:rPr lang="en-US" smtClean="0"/>
-              <a:t>4/20/2022</a:t>
+              <a:t>2/27/2023</a:t>
             </a:fld>
             <a:endParaRPr lang="en-US" dirty="0"/>
           </a:p>
@@ -8846,7 +8846,7 @@
           <a:p>
             <a:fld id="{C764DE79-268F-4C1A-8933-263129D2AF90}" type="datetimeFigureOut">
               <a:rPr lang="en-US" smtClean="0"/>
-              <a:t>4/20/2022</a:t>
+              <a:t>2/27/2023</a:t>
             </a:fld>
             <a:endParaRPr lang="en-US" dirty="0"/>
           </a:p>
@@ -28221,7 +28221,21 @@
                 <a:latin typeface="Arial" panose="020B0604020202020204" pitchFamily="34" charset="0"/>
                 <a:cs typeface="Arial" panose="020B0604020202020204" pitchFamily="34" charset="0"/>
               </a:rPr>
-              <a:t>DBSCAN detects the top-10 noisy features in -1 cluster, including {</a:t>
+              <a:t>DBSCAN detects </a:t>
+            </a:r>
+            <a:r>
+              <a:rPr lang="en-US" sz="1600">
+                <a:latin typeface="Arial" panose="020B0604020202020204" pitchFamily="34" charset="0"/>
+                <a:cs typeface="Arial" panose="020B0604020202020204" pitchFamily="34" charset="0"/>
+              </a:rPr>
+              <a:t>the top-15 </a:t>
+            </a:r>
+            <a:r>
+              <a:rPr lang="en-US" sz="1600" dirty="0">
+                <a:latin typeface="Arial" panose="020B0604020202020204" pitchFamily="34" charset="0"/>
+                <a:cs typeface="Arial" panose="020B0604020202020204" pitchFamily="34" charset="0"/>
+              </a:rPr>
+              <a:t>noisy features in -1 cluster, including {</a:t>
             </a:r>
             <a:r>
               <a:rPr lang="en-US" sz="1600" b="1" dirty="0">

</xml_diff>